<commit_message>
Update alt texts and todo tags
</commit_message>
<xml_diff>
--- a/powerpoints/01-web-and-you.pptx
+++ b/powerpoints/01-web-and-you.pptx
@@ -19491,7 +19491,23 @@
             </a:pPr>
             <a:r>
               <a:rPr/>
-              <a:t>Networks</a:t>
+              <a:t>Web</a:t>
+            </a:r>
+            <a:r>
+              <a:rPr/>
+              <a:t> </a:t>
+            </a:r>
+            <a:r>
+              <a:rPr/>
+              <a:t>and</a:t>
+            </a:r>
+            <a:r>
+              <a:rPr/>
+              <a:t> </a:t>
+            </a:r>
+            <a:r>
+              <a:rPr/>
+              <a:t>You</a:t>
             </a:r>
           </a:p>
         </p:txBody>

</xml_diff>